<commit_message>
this is the changed file
</commit_message>
<xml_diff>
--- a/BakerGina_GPA1-B.pptx
+++ b/BakerGina_GPA1-B.pptx
@@ -6,9 +6,10 @@
   </p:sldMasterIdLst>
   <p:sldIdLst>
     <p:sldId id="256" r:id="rId2"/>
-    <p:sldId id="257" r:id="rId3"/>
-    <p:sldId id="259" r:id="rId4"/>
-    <p:sldId id="258" r:id="rId5"/>
+    <p:sldId id="260" r:id="rId3"/>
+    <p:sldId id="257" r:id="rId4"/>
+    <p:sldId id="259" r:id="rId5"/>
+    <p:sldId id="258" r:id="rId6"/>
   </p:sldIdLst>
   <p:sldSz cx="12192000" cy="6858000"/>
   <p:notesSz cx="6858000" cy="9144000"/>
@@ -262,7 +263,7 @@
           <a:p>
             <a:fld id="{94621807-0EE6-41C5-85CE-F19B9A76B6E7}" type="datetimeFigureOut">
               <a:rPr lang="en-US" smtClean="0"/>
-              <a:t>1/12/2025</a:t>
+              <a:t>4/7/2025</a:t>
             </a:fld>
             <a:endParaRPr lang="en-US"/>
           </a:p>
@@ -460,7 +461,7 @@
           <a:p>
             <a:fld id="{94621807-0EE6-41C5-85CE-F19B9A76B6E7}" type="datetimeFigureOut">
               <a:rPr lang="en-US" smtClean="0"/>
-              <a:t>1/12/2025</a:t>
+              <a:t>4/7/2025</a:t>
             </a:fld>
             <a:endParaRPr lang="en-US"/>
           </a:p>
@@ -668,7 +669,7 @@
           <a:p>
             <a:fld id="{94621807-0EE6-41C5-85CE-F19B9A76B6E7}" type="datetimeFigureOut">
               <a:rPr lang="en-US" smtClean="0"/>
-              <a:t>1/12/2025</a:t>
+              <a:t>4/7/2025</a:t>
             </a:fld>
             <a:endParaRPr lang="en-US"/>
           </a:p>
@@ -866,7 +867,7 @@
           <a:p>
             <a:fld id="{94621807-0EE6-41C5-85CE-F19B9A76B6E7}" type="datetimeFigureOut">
               <a:rPr lang="en-US" smtClean="0"/>
-              <a:t>1/12/2025</a:t>
+              <a:t>4/7/2025</a:t>
             </a:fld>
             <a:endParaRPr lang="en-US"/>
           </a:p>
@@ -1141,7 +1142,7 @@
           <a:p>
             <a:fld id="{94621807-0EE6-41C5-85CE-F19B9A76B6E7}" type="datetimeFigureOut">
               <a:rPr lang="en-US" smtClean="0"/>
-              <a:t>1/12/2025</a:t>
+              <a:t>4/7/2025</a:t>
             </a:fld>
             <a:endParaRPr lang="en-US"/>
           </a:p>
@@ -1406,7 +1407,7 @@
           <a:p>
             <a:fld id="{94621807-0EE6-41C5-85CE-F19B9A76B6E7}" type="datetimeFigureOut">
               <a:rPr lang="en-US" smtClean="0"/>
-              <a:t>1/12/2025</a:t>
+              <a:t>4/7/2025</a:t>
             </a:fld>
             <a:endParaRPr lang="en-US"/>
           </a:p>
@@ -1818,7 +1819,7 @@
           <a:p>
             <a:fld id="{94621807-0EE6-41C5-85CE-F19B9A76B6E7}" type="datetimeFigureOut">
               <a:rPr lang="en-US" smtClean="0"/>
-              <a:t>1/12/2025</a:t>
+              <a:t>4/7/2025</a:t>
             </a:fld>
             <a:endParaRPr lang="en-US"/>
           </a:p>
@@ -1959,7 +1960,7 @@
           <a:p>
             <a:fld id="{94621807-0EE6-41C5-85CE-F19B9A76B6E7}" type="datetimeFigureOut">
               <a:rPr lang="en-US" smtClean="0"/>
-              <a:t>1/12/2025</a:t>
+              <a:t>4/7/2025</a:t>
             </a:fld>
             <a:endParaRPr lang="en-US"/>
           </a:p>
@@ -2072,7 +2073,7 @@
           <a:p>
             <a:fld id="{94621807-0EE6-41C5-85CE-F19B9A76B6E7}" type="datetimeFigureOut">
               <a:rPr lang="en-US" smtClean="0"/>
-              <a:t>1/12/2025</a:t>
+              <a:t>4/7/2025</a:t>
             </a:fld>
             <a:endParaRPr lang="en-US"/>
           </a:p>
@@ -2383,7 +2384,7 @@
           <a:p>
             <a:fld id="{94621807-0EE6-41C5-85CE-F19B9A76B6E7}" type="datetimeFigureOut">
               <a:rPr lang="en-US" smtClean="0"/>
-              <a:t>1/12/2025</a:t>
+              <a:t>4/7/2025</a:t>
             </a:fld>
             <a:endParaRPr lang="en-US"/>
           </a:p>
@@ -2671,7 +2672,7 @@
           <a:p>
             <a:fld id="{94621807-0EE6-41C5-85CE-F19B9A76B6E7}" type="datetimeFigureOut">
               <a:rPr lang="en-US" smtClean="0"/>
-              <a:t>1/12/2025</a:t>
+              <a:t>4/7/2025</a:t>
             </a:fld>
             <a:endParaRPr lang="en-US"/>
           </a:p>
@@ -2912,7 +2913,7 @@
           <a:p>
             <a:fld id="{94621807-0EE6-41C5-85CE-F19B9A76B6E7}" type="datetimeFigureOut">
               <a:rPr lang="en-US" smtClean="0"/>
-              <a:t>1/12/2025</a:t>
+              <a:t>4/7/2025</a:t>
             </a:fld>
             <a:endParaRPr lang="en-US"/>
           </a:p>
@@ -3416,6 +3417,112 @@
   <p:cSld>
     <p:spTree>
       <p:nvGrpSpPr>
+        <p:cNvPr id="1" name="">
+          <a:extLst>
+            <a:ext uri="{FF2B5EF4-FFF2-40B4-BE49-F238E27FC236}">
+              <a16:creationId xmlns:a16="http://schemas.microsoft.com/office/drawing/2014/main" id="{12D45319-0D52-9EF4-1158-F72463C4E99D}"/>
+            </a:ext>
+          </a:extLst>
+        </p:cNvPr>
+        <p:cNvGrpSpPr/>
+        <p:nvPr/>
+      </p:nvGrpSpPr>
+      <p:grpSpPr>
+        <a:xfrm>
+          <a:off x="0" y="0"/>
+          <a:ext cx="0" cy="0"/>
+          <a:chOff x="0" y="0"/>
+          <a:chExt cx="0" cy="0"/>
+        </a:xfrm>
+      </p:grpSpPr>
+      <p:sp>
+        <p:nvSpPr>
+          <p:cNvPr id="2" name="Title 1">
+            <a:extLst>
+              <a:ext uri="{FF2B5EF4-FFF2-40B4-BE49-F238E27FC236}">
+                <a16:creationId xmlns:a16="http://schemas.microsoft.com/office/drawing/2014/main" id="{D079485D-3014-31A6-22F4-AE66A7300678}"/>
+              </a:ext>
+            </a:extLst>
+          </p:cNvPr>
+          <p:cNvSpPr>
+            <a:spLocks noGrp="1"/>
+          </p:cNvSpPr>
+          <p:nvPr>
+            <p:ph type="ctrTitle"/>
+          </p:nvPr>
+        </p:nvSpPr>
+        <p:spPr>
+          <a:xfrm>
+            <a:off x="1524000" y="2235200"/>
+            <a:ext cx="9144000" cy="2387600"/>
+          </a:xfrm>
+        </p:spPr>
+        <p:txBody>
+          <a:bodyPr>
+            <a:normAutofit fontScale="90000"/>
+          </a:bodyPr>
+          <a:lstStyle/>
+          <a:p>
+            <a:r>
+              <a:rPr lang="en-US" b="0" i="1" dirty="0">
+                <a:solidFill>
+                  <a:srgbClr val="2D3B45"/>
+                </a:solidFill>
+                <a:effectLst/>
+                <a:latin typeface="Atkinson Hyperlegible"/>
+              </a:rPr>
+              <a:t>THIS FILE HAS BEEN CHANGED</a:t>
+            </a:r>
+            <a:br>
+              <a:rPr lang="en-US" b="0" i="1" dirty="0">
+                <a:solidFill>
+                  <a:srgbClr val="2D3B45"/>
+                </a:solidFill>
+                <a:effectLst/>
+                <a:latin typeface="Atkinson Hyperlegible"/>
+              </a:rPr>
+            </a:br>
+            <a:br>
+              <a:rPr lang="en-US" b="0" i="1" dirty="0">
+                <a:solidFill>
+                  <a:srgbClr val="2D3B45"/>
+                </a:solidFill>
+                <a:effectLst/>
+                <a:latin typeface="Atkinson Hyperlegible"/>
+              </a:rPr>
+            </a:br>
+            <a:r>
+              <a:rPr lang="en-US" b="0" i="1" dirty="0">
+                <a:solidFill>
+                  <a:srgbClr val="2D3B45"/>
+                </a:solidFill>
+                <a:effectLst/>
+                <a:latin typeface="Atkinson Hyperlegible"/>
+              </a:rPr>
+              <a:t>4/7/2025</a:t>
+            </a:r>
+            <a:endParaRPr lang="en-US" dirty="0"/>
+          </a:p>
+        </p:txBody>
+      </p:sp>
+    </p:spTree>
+    <p:extLst>
+      <p:ext uri="{BB962C8B-B14F-4D97-AF65-F5344CB8AC3E}">
+        <p14:creationId xmlns:p14="http://schemas.microsoft.com/office/powerpoint/2010/main" val="3195836193"/>
+      </p:ext>
+    </p:extLst>
+  </p:cSld>
+  <p:clrMapOvr>
+    <a:masterClrMapping/>
+  </p:clrMapOvr>
+</p:sld>
+</file>
+
+<file path=ppt/slides/slide3.xml><?xml version="1.0" encoding="utf-8"?>
+<p:sld xmlns:a="http://schemas.openxmlformats.org/drawingml/2006/main" xmlns:r="http://schemas.openxmlformats.org/officeDocument/2006/relationships" xmlns:p="http://schemas.openxmlformats.org/presentationml/2006/main">
+  <p:cSld>
+    <p:spTree>
+      <p:nvGrpSpPr>
         <p:cNvPr id="1" name=""/>
         <p:cNvGrpSpPr/>
         <p:nvPr/>
@@ -3504,7 +3611,7 @@
 </p:sld>
 </file>
 
-<file path=ppt/slides/slide3.xml><?xml version="1.0" encoding="utf-8"?>
+<file path=ppt/slides/slide4.xml><?xml version="1.0" encoding="utf-8"?>
 <p:sld xmlns:a="http://schemas.openxmlformats.org/drawingml/2006/main" xmlns:r="http://schemas.openxmlformats.org/officeDocument/2006/relationships" xmlns:p="http://schemas.openxmlformats.org/presentationml/2006/main">
   <p:cSld>
     <p:spTree>
@@ -3764,7 +3871,7 @@
 </p:sld>
 </file>
 
-<file path=ppt/slides/slide4.xml><?xml version="1.0" encoding="utf-8"?>
+<file path=ppt/slides/slide5.xml><?xml version="1.0" encoding="utf-8"?>
 <p:sld xmlns:a="http://schemas.openxmlformats.org/drawingml/2006/main" xmlns:r="http://schemas.openxmlformats.org/officeDocument/2006/relationships" xmlns:p="http://schemas.openxmlformats.org/presentationml/2006/main">
   <p:cSld>
     <p:spTree>

</xml_diff>